<commit_message>
Add WPF Blazor Hybrid docs link to deck
</commit_message>
<xml_diff>
--- a/2024/0221_BostonDotNetArch/Building a Native App for Windows - Boston .NET Arch UG.pptx
+++ b/2024/0221_BostonDotNetArch/Building a Native App for Windows - Boston .NET Arch UG.pptx
@@ -24961,7 +24961,7 @@
         <p:spPr>
           <a:xfrm>
             <a:off x="5039137" y="609600"/>
-            <a:ext cx="6132446" cy="1905000"/>
+            <a:ext cx="6132446" cy="1104900"/>
           </a:xfrm>
         </p:spPr>
         <p:txBody>
@@ -25059,8 +25059,8 @@
         </p:nvSpPr>
         <p:spPr>
           <a:xfrm>
-            <a:off x="5039138" y="2666999"/>
-            <a:ext cx="6271591" cy="3395871"/>
+            <a:off x="5039138" y="1919037"/>
+            <a:ext cx="6271591" cy="4143833"/>
           </a:xfrm>
         </p:spPr>
         <p:txBody>
@@ -25075,17 +25075,17 @@
               </a:lnSpc>
             </a:pPr>
             <a:r>
-              <a:rPr lang="en-US" sz="1700"/>
+              <a:rPr lang="en-US" sz="1700" dirty="0"/>
               <a:t>Windows App Development – Options &amp; Features: </a:t>
             </a:r>
             <a:r>
-              <a:rPr lang="en-US" sz="1700">
+              <a:rPr lang="en-US" sz="1700" dirty="0">
                 <a:hlinkClick r:id="rId5"/>
               </a:rPr>
               <a:t>https://learn.microsoft.com/windows/apps/get-started/dev-options</a:t>
             </a:r>
             <a:r>
-              <a:rPr lang="en-US" sz="1700"/>
+              <a:rPr lang="en-US" sz="1700" dirty="0"/>
               <a:t> </a:t>
             </a:r>
           </a:p>
@@ -25096,17 +25096,17 @@
               </a:lnSpc>
             </a:pPr>
             <a:r>
-              <a:rPr lang="en-US" sz="1700"/>
+              <a:rPr lang="en-US" sz="1700" dirty="0"/>
               <a:t>Overview of Windows Development Options: </a:t>
             </a:r>
             <a:r>
-              <a:rPr lang="en-US" sz="1700">
+              <a:rPr lang="en-US" sz="1700" dirty="0">
                 <a:hlinkClick r:id="rId6"/>
               </a:rPr>
               <a:t>https://learn.microsoft.com/windows/apps/get-started/</a:t>
             </a:r>
             <a:r>
-              <a:rPr lang="en-US" sz="1700"/>
+              <a:rPr lang="en-US" sz="1700" dirty="0"/>
               <a:t> </a:t>
             </a:r>
           </a:p>
@@ -25117,17 +25117,17 @@
               </a:lnSpc>
             </a:pPr>
             <a:r>
-              <a:rPr lang="en-US" sz="1700"/>
+              <a:rPr lang="en-US" sz="1700" dirty="0"/>
               <a:t>Uno Platform Documentation: </a:t>
             </a:r>
             <a:r>
-              <a:rPr lang="en-US" sz="1700">
+              <a:rPr lang="en-US" sz="1700" dirty="0">
                 <a:hlinkClick r:id="rId7"/>
               </a:rPr>
               <a:t>https://platform.uno/docs/articles/intro.html</a:t>
             </a:r>
             <a:r>
-              <a:rPr lang="en-US" sz="1700"/>
+              <a:rPr lang="en-US" sz="1700" dirty="0"/>
               <a:t> </a:t>
             </a:r>
           </a:p>
@@ -25138,17 +25138,17 @@
               </a:lnSpc>
             </a:pPr>
             <a:r>
-              <a:rPr lang="en-US" sz="1700"/>
+              <a:rPr lang="en-US" sz="1700" dirty="0"/>
               <a:t>Avalonia Docs: </a:t>
             </a:r>
             <a:r>
-              <a:rPr lang="en-US" sz="1700">
+              <a:rPr lang="en-US" sz="1700" dirty="0">
                 <a:hlinkClick r:id="rId8"/>
               </a:rPr>
               <a:t>https://docs.avaloniaui.net/</a:t>
             </a:r>
             <a:r>
-              <a:rPr lang="en-US" sz="1700"/>
+              <a:rPr lang="en-US" sz="1700" dirty="0"/>
               <a:t> </a:t>
             </a:r>
           </a:p>
@@ -25159,17 +25159,17 @@
               </a:lnSpc>
             </a:pPr>
             <a:r>
-              <a:rPr lang="en-US" sz="1700"/>
-              <a:t>My Books on Amazon: </a:t>
-            </a:r>
-            <a:r>
-              <a:rPr lang="en-US" sz="1700">
+              <a:rPr lang="en-US" sz="1700" dirty="0"/>
+              <a:t>Build a WPF Blazor Hybrid App: </a:t>
+            </a:r>
+            <a:r>
+              <a:rPr lang="en-US" sz="1700" dirty="0">
                 <a:hlinkClick r:id="rId9"/>
               </a:rPr>
-              <a:t>https://www.amazon.com/stores/author/B08WLD35BX</a:t>
-            </a:r>
-            <a:r>
-              <a:rPr lang="en-US" sz="1700"/>
+              <a:t>https://learn.microsoft.com/aspnet/core/blazor/hybrid/tutorials/wpf</a:t>
+            </a:r>
+            <a:r>
+              <a:rPr lang="en-US" sz="1700" dirty="0"/>
               <a:t> </a:t>
             </a:r>
           </a:p>
@@ -25180,17 +25180,38 @@
               </a:lnSpc>
             </a:pPr>
             <a:r>
-              <a:rPr lang="en-US" sz="1700"/>
-              <a:t>About Me with Social Links: </a:t>
-            </a:r>
-            <a:r>
-              <a:rPr lang="en-US" sz="1700">
+              <a:rPr lang="en-US" sz="1700" dirty="0"/>
+              <a:t>My Books on Amazon: </a:t>
+            </a:r>
+            <a:r>
+              <a:rPr lang="en-US" sz="1700" dirty="0">
                 <a:hlinkClick r:id="rId10"/>
               </a:rPr>
+              <a:t>https://www.amazon.com/stores/author/B08WLD35BX</a:t>
+            </a:r>
+            <a:r>
+              <a:rPr lang="en-US" sz="1700" dirty="0"/>
+              <a:t> </a:t>
+            </a:r>
+          </a:p>
+          <a:p>
+            <a:pPr>
+              <a:lnSpc>
+                <a:spcPct val="90000"/>
+              </a:lnSpc>
+            </a:pPr>
+            <a:r>
+              <a:rPr lang="en-US" sz="1700" dirty="0"/>
+              <a:t>About Me with Social Links: </a:t>
+            </a:r>
+            <a:r>
+              <a:rPr lang="en-US" sz="1700" dirty="0">
+                <a:hlinkClick r:id="rId11"/>
+              </a:rPr>
               <a:t>https://about.me/alvinashcraft</a:t>
             </a:r>
             <a:r>
-              <a:rPr lang="en-US" sz="1700"/>
+              <a:rPr lang="en-US" sz="1700" dirty="0"/>
               <a:t> </a:t>
             </a:r>
           </a:p>

</xml_diff>